<commit_message>
added pictures and pdf-version
</commit_message>
<xml_diff>
--- a/slides/bandgeraete.pptx
+++ b/slides/bandgeraete.pptx
@@ -5,10 +5,10 @@
     <p:sldMasterId id="2147483678" r:id="rId1"/>
   </p:sldMasterIdLst>
   <p:notesMasterIdLst>
-    <p:notesMasterId r:id="rId9"/>
+    <p:notesMasterId r:id="rId10"/>
   </p:notesMasterIdLst>
   <p:handoutMasterIdLst>
-    <p:handoutMasterId r:id="rId10"/>
+    <p:handoutMasterId r:id="rId11"/>
   </p:handoutMasterIdLst>
   <p:sldIdLst>
     <p:sldId id="256" r:id="rId2"/>
@@ -18,6 +18,7 @@
     <p:sldId id="276" r:id="rId6"/>
     <p:sldId id="277" r:id="rId7"/>
     <p:sldId id="278" r:id="rId8"/>
+    <p:sldId id="279" r:id="rId9"/>
   </p:sldIdLst>
   <p:sldSz cx="9144000" cy="5143500" type="screen16x9"/>
   <p:notesSz cx="7099300" cy="10234613"/>
@@ -148,7 +149,7 @@
   </p:defaultTextStyle>
   <p:extLst>
     <p:ext uri="{EFAFB233-063F-42B5-8137-9DF3F51BA10A}">
-      <p15:sldGuideLst xmlns:p15="http://schemas.microsoft.com/office/powerpoint/2012/main">
+      <p15:sldGuideLst xmlns:p15="http://schemas.microsoft.com/office/powerpoint/2012/main" xmlns="">
         <p15:guide id="1" orient="horz" pos="1620">
           <p15:clr>
             <a:srgbClr val="A4A3A4"/>
@@ -162,7 +163,7 @@
       </p15:sldGuideLst>
     </p:ext>
     <p:ext uri="{2D200454-40CA-4A62-9FC3-DE9A4176ACB9}">
-      <p15:notesGuideLst xmlns:p15="http://schemas.microsoft.com/office/powerpoint/2012/main"/>
+      <p15:notesGuideLst xmlns:p15="http://schemas.microsoft.com/office/powerpoint/2012/main" xmlns=""/>
     </p:ext>
   </p:extLst>
 </p:presentation>
@@ -398,7 +399,7 @@
               <a:pPr>
                 <a:defRPr/>
               </a:pPr>
-              <a:t>‹#›</a:t>
+              <a:t>‹Nr.›</a:t>
             </a:fld>
             <a:endParaRPr lang="de-DE"/>
           </a:p>
@@ -407,7 +408,7 @@
     </p:spTree>
     <p:extLst>
       <p:ext uri="{BB962C8B-B14F-4D97-AF65-F5344CB8AC3E}">
-        <p14:creationId xmlns:p14="http://schemas.microsoft.com/office/powerpoint/2010/main" val="3759918300"/>
+        <p14:creationId xmlns:p14="http://schemas.microsoft.com/office/powerpoint/2010/main" xmlns="" val="3759918300"/>
       </p:ext>
     </p:extLst>
   </p:cSld>
@@ -733,7 +734,7 @@
               <a:pPr>
                 <a:defRPr/>
               </a:pPr>
-              <a:t>‹#›</a:t>
+              <a:t>‹Nr.›</a:t>
             </a:fld>
             <a:endParaRPr lang="de-DE"/>
           </a:p>
@@ -742,7 +743,7 @@
     </p:spTree>
     <p:extLst>
       <p:ext uri="{BB962C8B-B14F-4D97-AF65-F5344CB8AC3E}">
-        <p14:creationId xmlns:p14="http://schemas.microsoft.com/office/powerpoint/2010/main" val="207168818"/>
+        <p14:creationId xmlns:p14="http://schemas.microsoft.com/office/powerpoint/2010/main" xmlns="" val="207168818"/>
       </p:ext>
     </p:extLst>
   </p:cSld>
@@ -2731,7 +2732,7 @@
               <a:pPr algn="r">
                 <a:defRPr/>
               </a:pPr>
-              <a:t>‹#›</a:t>
+              <a:t>‹Nr.›</a:t>
             </a:fld>
             <a:endParaRPr lang="de-DE" sz="1000" b="1" dirty="0">
               <a:solidFill>
@@ -3576,54 +3577,66 @@
           <a:p>
             <a:r>
               <a:rPr lang="de-DE" dirty="0" smtClean="0"/>
-              <a:t>Möglichkeiten 1</a:t>
+              <a:t>Vorhandene Hardware </a:t>
+            </a:r>
+            <a:r>
+              <a:rPr lang="de-DE" dirty="0" smtClean="0"/>
+              <a:t>1</a:t>
             </a:r>
             <a:endParaRPr lang="de-DE" dirty="0"/>
           </a:p>
         </p:txBody>
       </p:sp>
-      <p:sp>
-        <p:nvSpPr>
-          <p:cNvPr id="4" name="Content Placeholder 3"/>
-          <p:cNvSpPr>
-            <a:spLocks noGrp="1"/>
-          </p:cNvSpPr>
+      <p:pic>
+        <p:nvPicPr>
+          <p:cNvPr id="6" name="Inhaltsplatzhalter 5" descr="P1130441.JPG"/>
+          <p:cNvPicPr>
+            <a:picLocks noGrp="1" noChangeAspect="1"/>
+          </p:cNvPicPr>
           <p:nvPr>
             <p:ph sz="half" idx="1"/>
           </p:nvPr>
-        </p:nvSpPr>
-        <p:spPr/>
-        <p:txBody>
-          <a:bodyPr/>
-          <a:lstStyle/>
-          <a:p>
-            <a:endParaRPr lang="de-DE"/>
-          </a:p>
-        </p:txBody>
-      </p:sp>
-      <p:sp>
-        <p:nvSpPr>
-          <p:cNvPr id="5" name="Content Placeholder 4"/>
-          <p:cNvSpPr>
-            <a:spLocks noGrp="1"/>
-          </p:cNvSpPr>
+        </p:nvPicPr>
+        <p:blipFill>
+          <a:blip r:embed="rId2" cstate="print"/>
+          <a:stretch>
+            <a:fillRect/>
+          </a:stretch>
+        </p:blipFill>
+        <p:spPr>
+          <a:xfrm>
+            <a:off x="525566" y="1355725"/>
+            <a:ext cx="3695492" cy="3381375"/>
+          </a:xfrm>
+        </p:spPr>
+      </p:pic>
+      <p:pic>
+        <p:nvPicPr>
+          <p:cNvPr id="7" name="Inhaltsplatzhalter 6" descr="P1130450.JPG"/>
+          <p:cNvPicPr>
+            <a:picLocks noGrp="1" noChangeAspect="1"/>
+          </p:cNvPicPr>
           <p:nvPr>
             <p:ph sz="half" idx="2"/>
           </p:nvPr>
-        </p:nvSpPr>
-        <p:spPr/>
-        <p:txBody>
-          <a:bodyPr/>
-          <a:lstStyle/>
-          <a:p>
-            <a:endParaRPr lang="de-DE"/>
-          </a:p>
-        </p:txBody>
-      </p:sp>
+        </p:nvPicPr>
+        <p:blipFill>
+          <a:blip r:embed="rId3" cstate="print"/>
+          <a:stretch>
+            <a:fillRect/>
+          </a:stretch>
+        </p:blipFill>
+        <p:spPr>
+          <a:xfrm>
+            <a:off x="4648200" y="1454547"/>
+            <a:ext cx="4244975" cy="3183731"/>
+          </a:xfrm>
+        </p:spPr>
+      </p:pic>
     </p:spTree>
     <p:extLst>
       <p:ext uri="{BB962C8B-B14F-4D97-AF65-F5344CB8AC3E}">
-        <p14:creationId xmlns:p14="http://schemas.microsoft.com/office/powerpoint/2010/main" val="2698854006"/>
+        <p14:creationId xmlns:p14="http://schemas.microsoft.com/office/powerpoint/2010/main" xmlns="" val="2698854006"/>
       </p:ext>
     </p:extLst>
   </p:cSld>
@@ -3675,7 +3688,11 @@
           <a:p>
             <a:r>
               <a:rPr lang="de-DE" dirty="0" smtClean="0"/>
-              <a:t>Möglichkeiten 2</a:t>
+              <a:t>Vorhandene Hardware </a:t>
+            </a:r>
+            <a:r>
+              <a:rPr lang="de-DE" dirty="0" smtClean="0"/>
+              <a:t>2</a:t>
             </a:r>
             <a:endParaRPr lang="de-DE" dirty="0"/>
           </a:p>
@@ -3696,33 +3713,252 @@
           <a:bodyPr/>
           <a:lstStyle/>
           <a:p>
-            <a:endParaRPr lang="de-DE" dirty="0" smtClean="0"/>
+            <a:pPr lvl="1">
+              <a:buFont typeface="Arial" pitchFamily="34" charset="0"/>
+              <a:buChar char="•"/>
+            </a:pPr>
+            <a:r>
+              <a:rPr lang="de-DE" sz="1400" dirty="0" smtClean="0"/>
+              <a:t>Spulenwindungen und Spannung</a:t>
+            </a:r>
+          </a:p>
+          <a:p>
+            <a:pPr lvl="2">
+              <a:buFont typeface="Arial" pitchFamily="34" charset="0"/>
+              <a:buChar char="•"/>
+            </a:pPr>
+            <a:r>
+              <a:rPr lang="de-DE" sz="1000" dirty="0" smtClean="0"/>
+              <a:t>N1=600, N2=N3=29</a:t>
+            </a:r>
+          </a:p>
+          <a:p>
+            <a:pPr lvl="2">
+              <a:buFont typeface="Arial" pitchFamily="34" charset="0"/>
+              <a:buChar char="•"/>
+            </a:pPr>
+            <a:endParaRPr lang="de-DE" sz="1000" dirty="0" smtClean="0"/>
+          </a:p>
+          <a:p>
+            <a:pPr lvl="1">
+              <a:buFont typeface="Arial" pitchFamily="34" charset="0"/>
+              <a:buChar char="•"/>
+            </a:pPr>
+            <a:r>
+              <a:rPr lang="de-DE" sz="1400" dirty="0" smtClean="0"/>
+              <a:t>Netzspannung: 220V, </a:t>
+            </a:r>
+            <a:r>
+              <a:rPr lang="de-DE" sz="1400" dirty="0" smtClean="0"/>
+              <a:t>Leistung: </a:t>
+            </a:r>
+            <a:r>
+              <a:rPr lang="de-DE" sz="1400" dirty="0" smtClean="0"/>
+              <a:t>250W</a:t>
+            </a:r>
+          </a:p>
+          <a:p>
+            <a:pPr lvl="2">
+              <a:buFont typeface="Arial" pitchFamily="34" charset="0"/>
+              <a:buChar char="•"/>
+            </a:pPr>
+            <a:r>
+              <a:rPr lang="de-DE" sz="1000" dirty="0" smtClean="0"/>
+              <a:t>Kurzschlussstrom (max.): 250VA / 220V = 1,136 A</a:t>
+            </a:r>
+          </a:p>
+          <a:p>
+            <a:pPr lvl="2">
+              <a:buFont typeface="Arial" pitchFamily="34" charset="0"/>
+              <a:buChar char="•"/>
+            </a:pPr>
+            <a:endParaRPr lang="de-DE" sz="1000" dirty="0" smtClean="0"/>
+          </a:p>
+          <a:p>
+            <a:pPr lvl="1">
+              <a:buFont typeface="Arial" pitchFamily="34" charset="0"/>
+              <a:buChar char="•"/>
+            </a:pPr>
+            <a:r>
+              <a:rPr lang="de-DE" sz="1400" dirty="0" smtClean="0"/>
+              <a:t>Stromstärketransformation:</a:t>
+            </a:r>
+          </a:p>
+          <a:p>
+            <a:pPr lvl="2">
+              <a:buFont typeface="Arial" pitchFamily="34" charset="0"/>
+              <a:buChar char="•"/>
+            </a:pPr>
+            <a:r>
+              <a:rPr lang="de-DE" sz="1000" dirty="0" smtClean="0"/>
+              <a:t>I1 / I1 = N2 / N1 </a:t>
+            </a:r>
+            <a:r>
+              <a:rPr lang="de-DE" sz="1000" dirty="0" smtClean="0">
+                <a:sym typeface="Wingdings" pitchFamily="2" charset="2"/>
+              </a:rPr>
+              <a:t></a:t>
+            </a:r>
+            <a:r>
+              <a:rPr lang="de-DE" sz="1000" dirty="0" smtClean="0"/>
+              <a:t> </a:t>
+            </a:r>
+            <a:r>
+              <a:rPr lang="de-DE" sz="1000" dirty="0" smtClean="0"/>
+              <a:t>I2 </a:t>
+            </a:r>
+            <a:r>
+              <a:rPr lang="de-DE" sz="1000" dirty="0" smtClean="0"/>
+              <a:t> = (I1 * N1) </a:t>
+            </a:r>
+            <a:r>
+              <a:rPr lang="de-DE" sz="1000" dirty="0" smtClean="0"/>
+              <a:t>/ </a:t>
+            </a:r>
+            <a:r>
+              <a:rPr lang="de-DE" sz="1000" dirty="0" smtClean="0"/>
+              <a:t>N2</a:t>
+            </a:r>
+            <a:endParaRPr lang="de-DE" sz="800" dirty="0" smtClean="0"/>
+          </a:p>
+          <a:p>
+            <a:pPr lvl="2">
+              <a:buFont typeface="Arial" pitchFamily="34" charset="0"/>
+              <a:buChar char="•"/>
+            </a:pPr>
+            <a:r>
+              <a:rPr lang="de-DE" sz="1000" dirty="0" smtClean="0"/>
+              <a:t>I2 </a:t>
+            </a:r>
+            <a:r>
+              <a:rPr lang="de-DE" sz="1000" dirty="0" smtClean="0"/>
+              <a:t> = (1,136 A * 600) / 29 = 23,5 A</a:t>
+            </a:r>
+          </a:p>
+          <a:p>
+            <a:pPr lvl="2">
+              <a:buFont typeface="Arial" pitchFamily="34" charset="0"/>
+              <a:buChar char="•"/>
+            </a:pPr>
+            <a:r>
+              <a:rPr lang="de-DE" sz="1000" dirty="0" smtClean="0"/>
+              <a:t>Sicherungen deckeln bei 1x 5A und 2x 8A</a:t>
+            </a:r>
+          </a:p>
+          <a:p>
+            <a:pPr lvl="2">
+              <a:buFont typeface="Arial" pitchFamily="34" charset="0"/>
+              <a:buChar char="•"/>
+            </a:pPr>
+            <a:endParaRPr lang="de-DE" sz="1000" dirty="0" smtClean="0"/>
+          </a:p>
+          <a:p>
+            <a:pPr lvl="1">
+              <a:buFont typeface="Arial" pitchFamily="34" charset="0"/>
+              <a:buChar char="•"/>
+            </a:pPr>
+            <a:r>
+              <a:rPr lang="de-DE" sz="1400" dirty="0" smtClean="0"/>
+              <a:t>Spannungsübersetzung</a:t>
+            </a:r>
+            <a:r>
+              <a:rPr lang="de-DE" sz="1200" dirty="0" smtClean="0"/>
+              <a:t>:</a:t>
+            </a:r>
+          </a:p>
+          <a:p>
+            <a:pPr lvl="2">
+              <a:buFont typeface="Arial" pitchFamily="34" charset="0"/>
+              <a:buChar char="•"/>
+            </a:pPr>
+            <a:r>
+              <a:rPr lang="de-DE" sz="1000" dirty="0" smtClean="0"/>
+              <a:t>U1/ U2 = N1 / N1 </a:t>
+            </a:r>
+            <a:r>
+              <a:rPr lang="de-DE" sz="1000" dirty="0" smtClean="0">
+                <a:sym typeface="Wingdings" pitchFamily="2" charset="2"/>
+              </a:rPr>
+              <a:t> U2 = (U1 * N2) / N1</a:t>
+            </a:r>
+          </a:p>
+          <a:p>
+            <a:pPr lvl="2">
+              <a:buFont typeface="Arial" pitchFamily="34" charset="0"/>
+              <a:buChar char="•"/>
+            </a:pPr>
+            <a:r>
+              <a:rPr lang="de-DE" sz="1000" dirty="0" smtClean="0">
+                <a:sym typeface="Wingdings" pitchFamily="2" charset="2"/>
+              </a:rPr>
+              <a:t>U2 = (220 V * 29) / 600 = 10,63 V </a:t>
+            </a:r>
+            <a:r>
+              <a:rPr lang="de-DE" sz="1000" dirty="0" smtClean="0">
+                <a:latin typeface="+mj-lt"/>
+                <a:cs typeface="Times New Roman"/>
+                <a:sym typeface="Wingdings" pitchFamily="2" charset="2"/>
+              </a:rPr>
+              <a:t>≈</a:t>
+            </a:r>
+            <a:r>
+              <a:rPr lang="de-DE" sz="1000" dirty="0" smtClean="0">
+                <a:latin typeface="Times New Roman"/>
+                <a:cs typeface="Times New Roman"/>
+                <a:sym typeface="Wingdings" pitchFamily="2" charset="2"/>
+              </a:rPr>
+              <a:t> </a:t>
+            </a:r>
+            <a:r>
+              <a:rPr lang="de-DE" sz="1000" dirty="0" smtClean="0">
+                <a:sym typeface="Wingdings" pitchFamily="2" charset="2"/>
+              </a:rPr>
+              <a:t>12 </a:t>
+            </a:r>
+            <a:r>
+              <a:rPr lang="de-DE" sz="1000" dirty="0" smtClean="0">
+                <a:sym typeface="Wingdings" pitchFamily="2" charset="2"/>
+              </a:rPr>
+              <a:t>V</a:t>
+            </a:r>
+            <a:endParaRPr lang="de-DE" sz="800" dirty="0" smtClean="0"/>
+          </a:p>
+          <a:p>
+            <a:pPr lvl="1">
+              <a:buFont typeface="Arial" pitchFamily="34" charset="0"/>
+              <a:buChar char="•"/>
+            </a:pPr>
+            <a:endParaRPr lang="de-DE" sz="1400" dirty="0" smtClean="0"/>
           </a:p>
         </p:txBody>
       </p:sp>
-      <p:sp>
-        <p:nvSpPr>
-          <p:cNvPr id="6" name="Content Placeholder 5"/>
-          <p:cNvSpPr>
-            <a:spLocks noGrp="1"/>
-          </p:cNvSpPr>
+      <p:pic>
+        <p:nvPicPr>
+          <p:cNvPr id="7" name="Inhaltsplatzhalter 6" descr="P1130455.JPG"/>
+          <p:cNvPicPr>
+            <a:picLocks noGrp="1" noChangeAspect="1"/>
+          </p:cNvPicPr>
           <p:nvPr>
             <p:ph sz="half" idx="2"/>
           </p:nvPr>
-        </p:nvSpPr>
-        <p:spPr/>
-        <p:txBody>
-          <a:bodyPr/>
-          <a:lstStyle/>
-          <a:p>
-            <a:endParaRPr lang="de-DE"/>
-          </a:p>
-        </p:txBody>
-      </p:sp>
+        </p:nvPicPr>
+        <p:blipFill>
+          <a:blip r:embed="rId2" cstate="print"/>
+          <a:stretch>
+            <a:fillRect/>
+          </a:stretch>
+        </p:blipFill>
+        <p:spPr>
+          <a:xfrm>
+            <a:off x="4648200" y="1449240"/>
+            <a:ext cx="4244975" cy="3194344"/>
+          </a:xfrm>
+        </p:spPr>
+      </p:pic>
     </p:spTree>
     <p:extLst>
       <p:ext uri="{BB962C8B-B14F-4D97-AF65-F5344CB8AC3E}">
-        <p14:creationId xmlns:p14="http://schemas.microsoft.com/office/powerpoint/2010/main" val="3053521774"/>
+        <p14:creationId xmlns:p14="http://schemas.microsoft.com/office/powerpoint/2010/main" xmlns="" val="3053521774"/>
       </p:ext>
     </p:extLst>
   </p:cSld>
@@ -3873,6 +4109,7 @@
               <a:rPr lang="de-DE" sz="1600" dirty="0" smtClean="0"/>
               <a:t>Glücksrad</a:t>
             </a:r>
+            <a:endParaRPr lang="de-DE" sz="1600" dirty="0" smtClean="0"/>
           </a:p>
           <a:p>
             <a:pPr marL="285750" indent="-285750">
@@ -3891,7 +4128,15 @@
             </a:pPr>
             <a:r>
               <a:rPr lang="de-DE" sz="1600" dirty="0" smtClean="0"/>
-              <a:t>Die Spieler probieren mit der Kombination von Zahlenfolgen bzw. möglichst hohen Zahlen eine sehr hohe Gesamtpunktzahl zu erreichen</a:t>
+              <a:t>Die Spieler </a:t>
+            </a:r>
+            <a:r>
+              <a:rPr lang="de-DE" sz="1600" dirty="0" smtClean="0"/>
+              <a:t>versuchen mit </a:t>
+            </a:r>
+            <a:r>
+              <a:rPr lang="de-DE" sz="1600" dirty="0" smtClean="0"/>
+              <a:t>der Kombination von Zahlenfolgen bzw. möglichst hohen Zahlen eine sehr hohe Gesamtpunktzahl zu erreichen</a:t>
             </a:r>
           </a:p>
           <a:p>
@@ -3918,7 +4163,7 @@
     </p:spTree>
     <p:extLst>
       <p:ext uri="{BB962C8B-B14F-4D97-AF65-F5344CB8AC3E}">
-        <p14:creationId xmlns:p14="http://schemas.microsoft.com/office/powerpoint/2010/main" val="3587378439"/>
+        <p14:creationId xmlns:p14="http://schemas.microsoft.com/office/powerpoint/2010/main" xmlns="" val="3587378439"/>
       </p:ext>
     </p:extLst>
   </p:cSld>
@@ -4017,8 +4262,23 @@
             </a:pPr>
             <a:r>
               <a:rPr lang="de-DE" sz="2000" dirty="0" smtClean="0"/>
-              <a:t>Bibliothek für die entsprechende Infrastruktur zur Verfügung stellen</a:t>
-            </a:r>
+              <a:t>Bibliothek für die entsprechende Infrastruktur zur Verfügung </a:t>
+            </a:r>
+            <a:r>
+              <a:rPr lang="de-DE" sz="2000" dirty="0" smtClean="0"/>
+              <a:t>stellen</a:t>
+            </a:r>
+          </a:p>
+          <a:p>
+            <a:pPr marL="457200" indent="-457200">
+              <a:buFont typeface="Arial" panose="020B0604020202020204" pitchFamily="34" charset="0"/>
+              <a:buChar char="•"/>
+            </a:pPr>
+            <a:r>
+              <a:rPr lang="de-DE" sz="2000" dirty="0" smtClean="0"/>
+              <a:t>Masterknoten organisiert Daten für die Statistik auf der Webseite</a:t>
+            </a:r>
+            <a:endParaRPr lang="de-DE" sz="2000" dirty="0" smtClean="0"/>
           </a:p>
           <a:p>
             <a:pPr marL="457200" indent="-457200">
@@ -4046,7 +4306,7 @@
     </p:spTree>
     <p:extLst>
       <p:ext uri="{BB962C8B-B14F-4D97-AF65-F5344CB8AC3E}">
-        <p14:creationId xmlns:p14="http://schemas.microsoft.com/office/powerpoint/2010/main" val="2759879228"/>
+        <p14:creationId xmlns:p14="http://schemas.microsoft.com/office/powerpoint/2010/main" xmlns="" val="2759879228"/>
       </p:ext>
     </p:extLst>
   </p:cSld>
@@ -4124,7 +4384,7 @@
               <a:buChar char="•"/>
             </a:pPr>
             <a:r>
-              <a:rPr lang="de-DE" sz="1600" dirty="0" smtClean="0"/>
+              <a:rPr lang="de-DE" sz="2000" dirty="0" smtClean="0"/>
               <a:t>Einen Rechner pro Serverschrank</a:t>
             </a:r>
           </a:p>
@@ -4134,7 +4394,7 @@
               <a:buChar char="•"/>
             </a:pPr>
             <a:r>
-              <a:rPr lang="de-DE" sz="1600" dirty="0" smtClean="0"/>
+              <a:rPr lang="de-DE" sz="2000" dirty="0" smtClean="0"/>
               <a:t>Passende Magnetbänder</a:t>
             </a:r>
           </a:p>
@@ -4144,7 +4404,7 @@
               <a:buChar char="•"/>
             </a:pPr>
             <a:r>
-              <a:rPr lang="de-DE" sz="1600" dirty="0" smtClean="0"/>
+              <a:rPr lang="de-DE" sz="2000" dirty="0" smtClean="0"/>
               <a:t>Anzeige (7-Segment oder LCD oder ?)</a:t>
             </a:r>
           </a:p>
@@ -4154,7 +4414,7 @@
               <a:buChar char="•"/>
             </a:pPr>
             <a:r>
-              <a:rPr lang="de-DE" sz="1600" dirty="0" smtClean="0"/>
+              <a:rPr lang="de-DE" sz="2000" dirty="0" smtClean="0"/>
               <a:t>Steuerkreis ?</a:t>
             </a:r>
           </a:p>
@@ -4164,11 +4424,11 @@
               <a:buChar char="•"/>
             </a:pPr>
             <a:r>
-              <a:rPr lang="de-DE" sz="1600" dirty="0" err="1" smtClean="0"/>
+              <a:rPr lang="de-DE" sz="2000" dirty="0" err="1" smtClean="0"/>
               <a:t>Evt</a:t>
             </a:r>
             <a:r>
-              <a:rPr lang="de-DE" sz="1600" dirty="0" smtClean="0"/>
+              <a:rPr lang="de-DE" sz="2000" dirty="0" smtClean="0"/>
               <a:t>. alten Antrieb mit Schrittmotoren ersetzen</a:t>
             </a:r>
           </a:p>
@@ -4178,7 +4438,7 @@
               <a:buChar char="•"/>
             </a:pPr>
             <a:r>
-              <a:rPr lang="de-DE" sz="1600" dirty="0" smtClean="0"/>
+              <a:rPr lang="de-DE" sz="2000" dirty="0" smtClean="0"/>
               <a:t>Steuerkreis ?</a:t>
             </a:r>
           </a:p>
@@ -4188,7 +4448,7 @@
               <a:buChar char="•"/>
             </a:pPr>
             <a:r>
-              <a:rPr lang="de-DE" sz="1600" dirty="0" smtClean="0"/>
+              <a:rPr lang="de-DE" sz="2000" dirty="0" smtClean="0"/>
               <a:t>Kaputte Taster, Schalter ersetzen</a:t>
             </a:r>
           </a:p>
@@ -4198,7 +4458,7 @@
               <a:buChar char="•"/>
             </a:pPr>
             <a:r>
-              <a:rPr lang="de-DE" sz="1600" dirty="0" smtClean="0"/>
+              <a:rPr lang="de-DE" sz="2000" dirty="0" smtClean="0"/>
               <a:t>Glühlampen mit LED ersetzen</a:t>
             </a:r>
           </a:p>
@@ -4208,19 +4468,19 @@
               <a:buChar char="•"/>
             </a:pPr>
             <a:r>
-              <a:rPr lang="de-DE" sz="1600" dirty="0" smtClean="0"/>
+              <a:rPr lang="de-DE" sz="2000" dirty="0" smtClean="0"/>
               <a:t>Kaputte/verlorene Plastikteile ersetzen (3D-Drucken?)</a:t>
             </a:r>
           </a:p>
           <a:p>
-            <a:endParaRPr lang="de-DE" sz="1600" dirty="0"/>
+            <a:endParaRPr lang="de-DE" sz="2000" dirty="0"/>
           </a:p>
         </p:txBody>
       </p:sp>
     </p:spTree>
     <p:extLst>
       <p:ext uri="{BB962C8B-B14F-4D97-AF65-F5344CB8AC3E}">
-        <p14:creationId xmlns:p14="http://schemas.microsoft.com/office/powerpoint/2010/main" val="4048618436"/>
+        <p14:creationId xmlns:p14="http://schemas.microsoft.com/office/powerpoint/2010/main" xmlns="" val="4048618436"/>
       </p:ext>
     </p:extLst>
   </p:cSld>
@@ -4288,7 +4548,7 @@
             <p:ph idx="1"/>
             <p:extLst>
               <p:ext uri="{D42A27DB-BD31-4B8C-83A1-F6EECF244321}">
-                <p14:modId xmlns:p14="http://schemas.microsoft.com/office/powerpoint/2010/main" val="2062977345"/>
+                <p14:modId xmlns:p14="http://schemas.microsoft.com/office/powerpoint/2010/main" xmlns="" val="2062977345"/>
               </p:ext>
             </p:extLst>
           </p:nvPr>
@@ -4307,14 +4567,14 @@
                 <a:gridCol w="1115267">
                   <a:extLst>
                     <a:ext uri="{9D8B030D-6E8A-4147-A177-3AD203B41FA5}">
-                      <a16:colId xmlns:a16="http://schemas.microsoft.com/office/drawing/2014/main" val="2854159740"/>
+                      <a16:colId xmlns:a16="http://schemas.microsoft.com/office/drawing/2014/main" xmlns="" val="2854159740"/>
                     </a:ext>
                   </a:extLst>
                 </a:gridCol>
                 <a:gridCol w="7331725">
                   <a:extLst>
                     <a:ext uri="{9D8B030D-6E8A-4147-A177-3AD203B41FA5}">
-                      <a16:colId xmlns:a16="http://schemas.microsoft.com/office/drawing/2014/main" val="2191038580"/>
+                      <a16:colId xmlns:a16="http://schemas.microsoft.com/office/drawing/2014/main" xmlns="" val="2191038580"/>
                     </a:ext>
                   </a:extLst>
                 </a:gridCol>
@@ -4371,7 +4631,7 @@
                 </a:tc>
                 <a:extLst>
                   <a:ext uri="{0D108BD9-81ED-4DB2-BD59-A6C34878D82A}">
-                    <a16:rowId xmlns:a16="http://schemas.microsoft.com/office/drawing/2014/main" val="3061732656"/>
+                    <a16:rowId xmlns:a16="http://schemas.microsoft.com/office/drawing/2014/main" xmlns="" val="3061732656"/>
                   </a:ext>
                 </a:extLst>
               </a:tr>
@@ -4410,7 +4670,7 @@
                 </a:tc>
                 <a:extLst>
                   <a:ext uri="{0D108BD9-81ED-4DB2-BD59-A6C34878D82A}">
-                    <a16:rowId xmlns:a16="http://schemas.microsoft.com/office/drawing/2014/main" val="2750500573"/>
+                    <a16:rowId xmlns:a16="http://schemas.microsoft.com/office/drawing/2014/main" xmlns="" val="2750500573"/>
                   </a:ext>
                 </a:extLst>
               </a:tr>
@@ -4457,7 +4717,7 @@
                 </a:tc>
                 <a:extLst>
                   <a:ext uri="{0D108BD9-81ED-4DB2-BD59-A6C34878D82A}">
-                    <a16:rowId xmlns:a16="http://schemas.microsoft.com/office/drawing/2014/main" val="2106524739"/>
+                    <a16:rowId xmlns:a16="http://schemas.microsoft.com/office/drawing/2014/main" xmlns="" val="2106524739"/>
                   </a:ext>
                 </a:extLst>
               </a:tr>
@@ -4534,7 +4794,7 @@
                 </a:tc>
                 <a:extLst>
                   <a:ext uri="{0D108BD9-81ED-4DB2-BD59-A6C34878D82A}">
-                    <a16:rowId xmlns:a16="http://schemas.microsoft.com/office/drawing/2014/main" val="2681223462"/>
+                    <a16:rowId xmlns:a16="http://schemas.microsoft.com/office/drawing/2014/main" xmlns="" val="2681223462"/>
                   </a:ext>
                 </a:extLst>
               </a:tr>
@@ -4545,7 +4805,7 @@
     </p:spTree>
     <p:extLst>
       <p:ext uri="{BB962C8B-B14F-4D97-AF65-F5344CB8AC3E}">
-        <p14:creationId xmlns:p14="http://schemas.microsoft.com/office/powerpoint/2010/main" val="4078573489"/>
+        <p14:creationId xmlns:p14="http://schemas.microsoft.com/office/powerpoint/2010/main" xmlns="" val="4078573489"/>
       </p:ext>
     </p:extLst>
   </p:cSld>
@@ -4560,6 +4820,87 @@
       </p:par>
     </p:tnLst>
   </p:timing>
+</p:sld>
+</file>
+
+<file path=ppt/slides/slide8.xml><?xml version="1.0" encoding="utf-8"?>
+<p:sld xmlns:a="http://schemas.openxmlformats.org/drawingml/2006/main" xmlns:r="http://schemas.openxmlformats.org/officeDocument/2006/relationships" xmlns:p="http://schemas.openxmlformats.org/presentationml/2006/main">
+  <p:cSld>
+    <p:spTree>
+      <p:nvGrpSpPr>
+        <p:cNvPr id="1" name=""/>
+        <p:cNvGrpSpPr/>
+        <p:nvPr/>
+      </p:nvGrpSpPr>
+      <p:grpSpPr>
+        <a:xfrm>
+          <a:off x="0" y="0"/>
+          <a:ext cx="0" cy="0"/>
+          <a:chOff x="0" y="0"/>
+          <a:chExt cx="0" cy="0"/>
+        </a:xfrm>
+      </p:grpSpPr>
+      <p:sp>
+        <p:nvSpPr>
+          <p:cNvPr id="2" name="Titel 1"/>
+          <p:cNvSpPr>
+            <a:spLocks noGrp="1"/>
+          </p:cNvSpPr>
+          <p:nvPr>
+            <p:ph type="title"/>
+          </p:nvPr>
+        </p:nvSpPr>
+        <p:spPr>
+          <a:xfrm>
+            <a:off x="685800" y="957568"/>
+            <a:ext cx="7772400" cy="1021556"/>
+          </a:xfrm>
+        </p:spPr>
+        <p:txBody>
+          <a:bodyPr/>
+          <a:lstStyle/>
+          <a:p>
+            <a:pPr algn="r"/>
+            <a:r>
+              <a:rPr lang="de-DE" sz="2800" dirty="0" smtClean="0"/>
+              <a:t>Danke für Eure Aufmerksamkeit</a:t>
+            </a:r>
+            <a:endParaRPr lang="de-DE" sz="2800" dirty="0"/>
+          </a:p>
+        </p:txBody>
+      </p:sp>
+      <p:pic>
+        <p:nvPicPr>
+          <p:cNvPr id="1026" name="Picture 2" descr="D:\Eigene Dateien\Eigene Bilder\Softwareprojekt\Auswahl\P1130442.JPG"/>
+          <p:cNvPicPr>
+            <a:picLocks noChangeAspect="1" noChangeArrowheads="1"/>
+          </p:cNvPicPr>
+          <p:nvPr/>
+        </p:nvPicPr>
+        <p:blipFill>
+          <a:blip r:embed="rId2" cstate="print"/>
+          <a:srcRect/>
+          <a:stretch>
+            <a:fillRect/>
+          </a:stretch>
+        </p:blipFill>
+        <p:spPr bwMode="auto">
+          <a:xfrm>
+            <a:off x="3648075" y="1564337"/>
+            <a:ext cx="4810125" cy="2914636"/>
+          </a:xfrm>
+          <a:prstGeom prst="rect">
+            <a:avLst/>
+          </a:prstGeom>
+          <a:noFill/>
+        </p:spPr>
+      </p:pic>
+    </p:spTree>
+  </p:cSld>
+  <p:clrMapOvr>
+    <a:masterClrMapping/>
+  </p:clrMapOvr>
+  <p:transition spd="slow"/>
 </p:sld>
 </file>
 

</xml_diff>

<commit_message>
added another picture and some comma
</commit_message>
<xml_diff>
--- a/slides/bandgeraete.pptx
+++ b/slides/bandgeraete.pptx
@@ -5,20 +5,21 @@
     <p:sldMasterId id="2147483678" r:id="rId1"/>
   </p:sldMasterIdLst>
   <p:notesMasterIdLst>
-    <p:notesMasterId r:id="rId10"/>
+    <p:notesMasterId r:id="rId11"/>
   </p:notesMasterIdLst>
   <p:handoutMasterIdLst>
-    <p:handoutMasterId r:id="rId11"/>
+    <p:handoutMasterId r:id="rId12"/>
   </p:handoutMasterIdLst>
   <p:sldIdLst>
     <p:sldId id="256" r:id="rId2"/>
     <p:sldId id="273" r:id="rId3"/>
     <p:sldId id="274" r:id="rId4"/>
-    <p:sldId id="275" r:id="rId5"/>
-    <p:sldId id="276" r:id="rId6"/>
-    <p:sldId id="277" r:id="rId7"/>
-    <p:sldId id="278" r:id="rId8"/>
-    <p:sldId id="279" r:id="rId9"/>
+    <p:sldId id="280" r:id="rId5"/>
+    <p:sldId id="275" r:id="rId6"/>
+    <p:sldId id="276" r:id="rId7"/>
+    <p:sldId id="277" r:id="rId8"/>
+    <p:sldId id="278" r:id="rId9"/>
+    <p:sldId id="279" r:id="rId10"/>
   </p:sldIdLst>
   <p:sldSz cx="9144000" cy="5143500" type="screen16x9"/>
   <p:notesSz cx="7099300" cy="10234613"/>
@@ -149,7 +150,7 @@
   </p:defaultTextStyle>
   <p:extLst>
     <p:ext uri="{EFAFB233-063F-42B5-8137-9DF3F51BA10A}">
-      <p15:sldGuideLst xmlns:p15="http://schemas.microsoft.com/office/powerpoint/2012/main" xmlns="">
+      <p15:sldGuideLst xmlns="" xmlns:p15="http://schemas.microsoft.com/office/powerpoint/2012/main">
         <p15:guide id="1" orient="horz" pos="1620">
           <p15:clr>
             <a:srgbClr val="A4A3A4"/>
@@ -163,7 +164,7 @@
       </p15:sldGuideLst>
     </p:ext>
     <p:ext uri="{2D200454-40CA-4A62-9FC3-DE9A4176ACB9}">
-      <p15:notesGuideLst xmlns:p15="http://schemas.microsoft.com/office/powerpoint/2012/main" xmlns=""/>
+      <p15:notesGuideLst xmlns="" xmlns:p15="http://schemas.microsoft.com/office/powerpoint/2012/main"/>
     </p:ext>
   </p:extLst>
 </p:presentation>
@@ -408,7 +409,7 @@
     </p:spTree>
     <p:extLst>
       <p:ext uri="{BB962C8B-B14F-4D97-AF65-F5344CB8AC3E}">
-        <p14:creationId xmlns:p14="http://schemas.microsoft.com/office/powerpoint/2010/main" xmlns="" val="3759918300"/>
+        <p14:creationId xmlns="" xmlns:p14="http://schemas.microsoft.com/office/powerpoint/2010/main" val="3759918300"/>
       </p:ext>
     </p:extLst>
   </p:cSld>
@@ -743,7 +744,7 @@
     </p:spTree>
     <p:extLst>
       <p:ext uri="{BB962C8B-B14F-4D97-AF65-F5344CB8AC3E}">
-        <p14:creationId xmlns:p14="http://schemas.microsoft.com/office/powerpoint/2010/main" xmlns="" val="207168818"/>
+        <p14:creationId xmlns="" xmlns:p14="http://schemas.microsoft.com/office/powerpoint/2010/main" val="207168818"/>
       </p:ext>
     </p:extLst>
   </p:cSld>
@@ -3577,11 +3578,7 @@
           <a:p>
             <a:r>
               <a:rPr lang="de-DE" dirty="0" smtClean="0"/>
-              <a:t>Vorhandene Hardware </a:t>
-            </a:r>
-            <a:r>
-              <a:rPr lang="de-DE" dirty="0" smtClean="0"/>
-              <a:t>1</a:t>
+              <a:t>Vorhandene Hardware 1</a:t>
             </a:r>
             <a:endParaRPr lang="de-DE" dirty="0"/>
           </a:p>
@@ -3636,7 +3633,7 @@
     </p:spTree>
     <p:extLst>
       <p:ext uri="{BB962C8B-B14F-4D97-AF65-F5344CB8AC3E}">
-        <p14:creationId xmlns:p14="http://schemas.microsoft.com/office/powerpoint/2010/main" xmlns="" val="2698854006"/>
+        <p14:creationId xmlns="" xmlns:p14="http://schemas.microsoft.com/office/powerpoint/2010/main" val="2698854006"/>
       </p:ext>
     </p:extLst>
   </p:cSld>
@@ -3688,11 +3685,7 @@
           <a:p>
             <a:r>
               <a:rPr lang="de-DE" dirty="0" smtClean="0"/>
-              <a:t>Vorhandene Hardware </a:t>
-            </a:r>
-            <a:r>
-              <a:rPr lang="de-DE" dirty="0" smtClean="0"/>
-              <a:t>2</a:t>
+              <a:t>Vorhandene Hardware 2</a:t>
             </a:r>
             <a:endParaRPr lang="de-DE" dirty="0"/>
           </a:p>
@@ -3746,15 +3739,7 @@
             </a:pPr>
             <a:r>
               <a:rPr lang="de-DE" sz="1400" dirty="0" smtClean="0"/>
-              <a:t>Netzspannung: 220V, </a:t>
-            </a:r>
-            <a:r>
-              <a:rPr lang="de-DE" sz="1400" dirty="0" smtClean="0"/>
-              <a:t>Leistung: </a:t>
-            </a:r>
-            <a:r>
-              <a:rPr lang="de-DE" sz="1400" dirty="0" smtClean="0"/>
-              <a:t>250W</a:t>
+              <a:t>Netzspannung: 220V, Leistung: 250W</a:t>
             </a:r>
           </a:p>
           <a:p>
@@ -3801,23 +3786,7 @@
             </a:r>
             <a:r>
               <a:rPr lang="de-DE" sz="1000" dirty="0" smtClean="0"/>
-              <a:t> </a:t>
-            </a:r>
-            <a:r>
-              <a:rPr lang="de-DE" sz="1000" dirty="0" smtClean="0"/>
-              <a:t>I2 </a:t>
-            </a:r>
-            <a:r>
-              <a:rPr lang="de-DE" sz="1000" dirty="0" smtClean="0"/>
-              <a:t> = (I1 * N1) </a:t>
-            </a:r>
-            <a:r>
-              <a:rPr lang="de-DE" sz="1000" dirty="0" smtClean="0"/>
-              <a:t>/ </a:t>
-            </a:r>
-            <a:r>
-              <a:rPr lang="de-DE" sz="1000" dirty="0" smtClean="0"/>
-              <a:t>N2</a:t>
+              <a:t> I2  = (I1 * N1) / N2</a:t>
             </a:r>
             <a:endParaRPr lang="de-DE" sz="800" dirty="0" smtClean="0"/>
           </a:p>
@@ -3828,11 +3797,7 @@
             </a:pPr>
             <a:r>
               <a:rPr lang="de-DE" sz="1000" dirty="0" smtClean="0"/>
-              <a:t>I2 </a:t>
-            </a:r>
-            <a:r>
-              <a:rPr lang="de-DE" sz="1000" dirty="0" smtClean="0"/>
-              <a:t> = (1,136 A * 600) / 29 = 23,5 A</a:t>
+              <a:t>I2  = (1,136 A * 600) / 29 = 23,5 A</a:t>
             </a:r>
           </a:p>
           <a:p>
@@ -3913,7 +3878,7 @@
               <a:rPr lang="de-DE" sz="1000" dirty="0" smtClean="0">
                 <a:sym typeface="Wingdings" pitchFamily="2" charset="2"/>
               </a:rPr>
-              <a:t>12 </a:t>
+              <a:t>11 </a:t>
             </a:r>
             <a:r>
               <a:rPr lang="de-DE" sz="1000" dirty="0" smtClean="0">
@@ -3958,7 +3923,7 @@
     </p:spTree>
     <p:extLst>
       <p:ext uri="{BB962C8B-B14F-4D97-AF65-F5344CB8AC3E}">
-        <p14:creationId xmlns:p14="http://schemas.microsoft.com/office/powerpoint/2010/main" xmlns="" val="3053521774"/>
+        <p14:creationId xmlns="" xmlns:p14="http://schemas.microsoft.com/office/powerpoint/2010/main" val="3053521774"/>
       </p:ext>
     </p:extLst>
   </p:cSld>
@@ -3995,7 +3960,7 @@
       </p:grpSpPr>
       <p:sp>
         <p:nvSpPr>
-          <p:cNvPr id="5" name="Title 4"/>
+          <p:cNvPr id="4" name="Title 3"/>
           <p:cNvSpPr>
             <a:spLocks noGrp="1"/>
           </p:cNvSpPr>
@@ -4010,160 +3975,200 @@
           <a:p>
             <a:r>
               <a:rPr lang="de-DE" dirty="0" smtClean="0"/>
-              <a:t>Minimales Projekt</a:t>
+              <a:t>Vorhandene Hardware </a:t>
+            </a:r>
+            <a:r>
+              <a:rPr lang="de-DE" dirty="0" smtClean="0"/>
+              <a:t>3</a:t>
             </a:r>
             <a:endParaRPr lang="de-DE" dirty="0"/>
+          </a:p>
+        </p:txBody>
+      </p:sp>
+      <p:pic>
+        <p:nvPicPr>
+          <p:cNvPr id="11" name="Inhaltsplatzhalter 10" descr="photo_2017-05-15_13-05-41.jpg"/>
+          <p:cNvPicPr>
+            <a:picLocks noGrp="1" noChangeAspect="1"/>
+          </p:cNvPicPr>
+          <p:nvPr>
+            <p:ph sz="half" idx="1"/>
+          </p:nvPr>
+        </p:nvPicPr>
+        <p:blipFill>
+          <a:blip r:embed="rId2" cstate="print"/>
+          <a:stretch>
+            <a:fillRect/>
+          </a:stretch>
+        </p:blipFill>
+        <p:spPr>
+          <a:xfrm>
+            <a:off x="250825" y="1454547"/>
+            <a:ext cx="4244975" cy="3183731"/>
+          </a:xfrm>
+        </p:spPr>
+      </p:pic>
+      <p:pic>
+        <p:nvPicPr>
+          <p:cNvPr id="8" name="Inhaltsplatzhalter 7" descr="electrocraft.PNG"/>
+          <p:cNvPicPr>
+            <a:picLocks noGrp="1" noChangeAspect="1"/>
+          </p:cNvPicPr>
+          <p:nvPr>
+            <p:ph sz="half" idx="2"/>
+          </p:nvPr>
+        </p:nvPicPr>
+        <p:blipFill>
+          <a:blip r:embed="rId3" cstate="print"/>
+          <a:stretch>
+            <a:fillRect/>
+          </a:stretch>
+        </p:blipFill>
+        <p:spPr>
+          <a:xfrm>
+            <a:off x="4636770" y="1469985"/>
+            <a:ext cx="4244975" cy="1388825"/>
+          </a:xfrm>
+        </p:spPr>
+      </p:pic>
+      <p:sp>
+        <p:nvSpPr>
+          <p:cNvPr id="9" name="Textfeld 8"/>
+          <p:cNvSpPr txBox="1"/>
+          <p:nvPr/>
+        </p:nvSpPr>
+        <p:spPr>
+          <a:xfrm>
+            <a:off x="5016633" y="3027045"/>
+            <a:ext cx="3485249" cy="400110"/>
+          </a:xfrm>
+          <a:prstGeom prst="rect">
+            <a:avLst/>
+          </a:prstGeom>
+          <a:noFill/>
+        </p:spPr>
+        <p:txBody>
+          <a:bodyPr wrap="none" rtlCol="0">
+            <a:spAutoFit/>
+          </a:bodyPr>
+          <a:lstStyle/>
+          <a:p>
+            <a:pPr algn="ctr"/>
+            <a:r>
+              <a:rPr lang="de-DE" sz="1000" dirty="0" smtClean="0">
+                <a:hlinkClick r:id="rId4"/>
+              </a:rPr>
+              <a:t>http://</a:t>
+            </a:r>
+            <a:r>
+              <a:rPr lang="de-DE" sz="1000" dirty="0" smtClean="0">
+                <a:hlinkClick r:id="rId4"/>
+              </a:rPr>
+              <a:t>www.electrocraft.com/pdf.php?pdf=files/DC05EN.pdf</a:t>
+            </a:r>
+            <a:endParaRPr lang="de-DE" sz="1000" dirty="0" smtClean="0"/>
+          </a:p>
+          <a:p>
+            <a:endParaRPr lang="de-DE" sz="1000" dirty="0" smtClean="0"/>
           </a:p>
         </p:txBody>
       </p:sp>
       <p:sp>
         <p:nvSpPr>
-          <p:cNvPr id="6" name="Content Placeholder 5"/>
-          <p:cNvSpPr>
-            <a:spLocks noGrp="1"/>
-          </p:cNvSpPr>
-          <p:nvPr>
-            <p:ph idx="1"/>
-          </p:nvPr>
+          <p:cNvPr id="12" name="Textfeld 11"/>
+          <p:cNvSpPr txBox="1"/>
+          <p:nvPr/>
         </p:nvSpPr>
-        <p:spPr/>
+        <p:spPr>
+          <a:xfrm>
+            <a:off x="5142981" y="3533775"/>
+            <a:ext cx="3232552" cy="646331"/>
+          </a:xfrm>
+          <a:prstGeom prst="rect">
+            <a:avLst/>
+          </a:prstGeom>
+          <a:noFill/>
+          <a:ln>
+            <a:solidFill>
+              <a:schemeClr val="tx2">
+                <a:lumMod val="60000"/>
+                <a:lumOff val="40000"/>
+              </a:schemeClr>
+            </a:solidFill>
+          </a:ln>
+          <a:effectLst>
+            <a:outerShdw blurRad="50800" dist="50800" dir="5400000" sx="1000" sy="1000" algn="ctr" rotWithShape="0">
+              <a:srgbClr val="000000">
+                <a:alpha val="43137"/>
+              </a:srgbClr>
+            </a:outerShdw>
+          </a:effectLst>
+        </p:spPr>
         <p:txBody>
-          <a:bodyPr/>
+          <a:bodyPr wrap="none" rtlCol="0">
+            <a:spAutoFit/>
+          </a:bodyPr>
           <a:lstStyle/>
           <a:p>
-            <a:r>
-              <a:rPr lang="de-DE" sz="1600" dirty="0" smtClean="0"/>
-              <a:t>Reaktionsspiel</a:t>
-            </a:r>
-          </a:p>
-          <a:p>
-            <a:pPr marL="457200" indent="-457200">
-              <a:buFont typeface="Arial" panose="020B0604020202020204" pitchFamily="34" charset="0"/>
-              <a:buChar char="•"/>
-            </a:pPr>
-            <a:r>
-              <a:rPr lang="de-DE" sz="1600" dirty="0" smtClean="0"/>
-              <a:t>Beide Bänder laufen eine zufällige Zeit</a:t>
-            </a:r>
-          </a:p>
-          <a:p>
-            <a:pPr marL="812800" lvl="1" indent="-457200">
-              <a:buFont typeface="Arial" panose="020B0604020202020204" pitchFamily="34" charset="0"/>
-              <a:buChar char="•"/>
-            </a:pPr>
-            <a:r>
-              <a:rPr lang="de-DE" sz="1600" dirty="0" smtClean="0"/>
-              <a:t>Gleiche oder verschiedene </a:t>
-            </a:r>
-            <a:r>
-              <a:rPr lang="de-DE" sz="1600" dirty="0"/>
-              <a:t>zufällige </a:t>
-            </a:r>
-            <a:r>
-              <a:rPr lang="de-DE" sz="1600" dirty="0" smtClean="0"/>
-              <a:t>Zeit?</a:t>
-            </a:r>
-          </a:p>
-          <a:p>
-            <a:pPr marL="812800" lvl="1" indent="-457200">
-              <a:buFont typeface="Arial" panose="020B0604020202020204" pitchFamily="34" charset="0"/>
-              <a:buChar char="•"/>
-            </a:pPr>
-            <a:r>
-              <a:rPr lang="de-DE" sz="1600" dirty="0" smtClean="0"/>
-              <a:t>Spielregeln und Protokoll entwerfen</a:t>
-            </a:r>
-          </a:p>
-          <a:p>
-            <a:pPr marL="457200" indent="-457200">
-              <a:buFont typeface="Arial" panose="020B0604020202020204" pitchFamily="34" charset="0"/>
-              <a:buChar char="•"/>
-            </a:pPr>
-            <a:r>
-              <a:rPr lang="de-DE" sz="1600" dirty="0" smtClean="0"/>
-              <a:t>Sobald das Band stoppt reagieren die Spieler schnellstmöglich mit Tastendruck</a:t>
-            </a:r>
-          </a:p>
-          <a:p>
-            <a:pPr marL="457200" indent="-457200">
-              <a:buFont typeface="Arial" panose="020B0604020202020204" pitchFamily="34" charset="0"/>
-              <a:buChar char="•"/>
-            </a:pPr>
-            <a:r>
-              <a:rPr lang="de-DE" sz="1600" dirty="0" smtClean="0"/>
-              <a:t>Die Zeitdifferenz zwischen Bandstopp und Tastendruck wird gemessen</a:t>
-            </a:r>
-          </a:p>
-          <a:p>
-            <a:pPr marL="457200" indent="-457200">
-              <a:buFont typeface="Arial" panose="020B0604020202020204" pitchFamily="34" charset="0"/>
-              <a:buChar char="•"/>
-            </a:pPr>
-            <a:r>
-              <a:rPr lang="de-DE" sz="1600" dirty="0" smtClean="0"/>
-              <a:t>Die Knoten handeln den Sieger aus und geben diesen auf einer Anzeige aus</a:t>
-            </a:r>
-          </a:p>
-          <a:p>
-            <a:r>
-              <a:rPr lang="de-DE" sz="1600" dirty="0" smtClean="0"/>
-              <a:t>Glücksrad</a:t>
-            </a:r>
-            <a:endParaRPr lang="de-DE" sz="1600" dirty="0" smtClean="0"/>
-          </a:p>
-          <a:p>
-            <a:pPr marL="285750" indent="-285750">
-              <a:buFont typeface="Arial" panose="020B0604020202020204" pitchFamily="34" charset="0"/>
-              <a:buChar char="•"/>
-            </a:pPr>
-            <a:r>
-              <a:rPr lang="de-DE" sz="1600" dirty="0" smtClean="0"/>
-              <a:t>Im Fall dass kein Band benutzt werden kann</a:t>
-            </a:r>
-          </a:p>
-          <a:p>
-            <a:pPr marL="285750" indent="-285750">
-              <a:buFont typeface="Arial" panose="020B0604020202020204" pitchFamily="34" charset="0"/>
-              <a:buChar char="•"/>
-            </a:pPr>
-            <a:r>
-              <a:rPr lang="de-DE" sz="1600" dirty="0" smtClean="0"/>
-              <a:t>Die Spieler </a:t>
-            </a:r>
-            <a:r>
-              <a:rPr lang="de-DE" sz="1600" dirty="0" smtClean="0"/>
-              <a:t>versuchen mit </a:t>
-            </a:r>
-            <a:r>
-              <a:rPr lang="de-DE" sz="1600" dirty="0" smtClean="0"/>
-              <a:t>der Kombination von Zahlenfolgen bzw. möglichst hohen Zahlen eine sehr hohe Gesamtpunktzahl zu erreichen</a:t>
-            </a:r>
-          </a:p>
-          <a:p>
-            <a:pPr marL="285750" indent="-285750">
-              <a:buFont typeface="Arial" panose="020B0604020202020204" pitchFamily="34" charset="0"/>
-              <a:buChar char="•"/>
-            </a:pPr>
-            <a:r>
-              <a:rPr lang="de-DE" sz="1600" dirty="0" err="1"/>
-              <a:t>Kompetitivität</a:t>
-            </a:r>
-            <a:r>
-              <a:rPr lang="de-DE" sz="1600" dirty="0"/>
+            <a:pPr algn="ctr"/>
+            <a:r>
+              <a:rPr lang="de-DE" dirty="0" smtClean="0"/>
+              <a:t>Ausgehend von</a:t>
+            </a:r>
+            <a:r>
+              <a:rPr lang="de-DE" dirty="0" smtClean="0"/>
               <a:t> </a:t>
             </a:r>
             <a:r>
-              <a:rPr lang="de-DE" sz="1600" dirty="0" smtClean="0"/>
-              <a:t>fragwürdig?</a:t>
-            </a:r>
-            <a:endParaRPr lang="de-DE" sz="1600" dirty="0"/>
+              <a:rPr lang="de-DE" dirty="0" smtClean="0"/>
+              <a:t>11V und 3</a:t>
+            </a:r>
+            <a:r>
+              <a:rPr lang="el-GR" dirty="0" smtClean="0">
+                <a:latin typeface="Arial"/>
+                <a:cs typeface="Arial"/>
+              </a:rPr>
+              <a:t>Ω</a:t>
+            </a:r>
+            <a:r>
+              <a:rPr lang="de-DE" dirty="0" smtClean="0">
+                <a:latin typeface="Arial"/>
+                <a:cs typeface="Arial"/>
+              </a:rPr>
+              <a:t>:</a:t>
+            </a:r>
+          </a:p>
+          <a:p>
+            <a:pPr algn="ctr"/>
+            <a:r>
+              <a:rPr lang="de-DE" dirty="0" smtClean="0">
+                <a:latin typeface="Arial"/>
+                <a:cs typeface="Arial"/>
+              </a:rPr>
+              <a:t>I = U / R = 11 V / 3 </a:t>
+            </a:r>
+            <a:r>
+              <a:rPr lang="el-GR" dirty="0" smtClean="0">
+                <a:latin typeface="Arial"/>
+                <a:cs typeface="Arial"/>
+              </a:rPr>
+              <a:t>Ω</a:t>
+            </a:r>
+            <a:r>
+              <a:rPr lang="de-DE" dirty="0" smtClean="0">
+                <a:latin typeface="Arial"/>
+                <a:cs typeface="Arial"/>
+              </a:rPr>
+              <a:t> = 3,66 A</a:t>
+            </a:r>
+            <a:endParaRPr lang="de-DE" dirty="0"/>
           </a:p>
         </p:txBody>
       </p:sp>
     </p:spTree>
     <p:extLst>
       <p:ext uri="{BB962C8B-B14F-4D97-AF65-F5344CB8AC3E}">
-        <p14:creationId xmlns:p14="http://schemas.microsoft.com/office/powerpoint/2010/main" xmlns="" val="3587378439"/>
+        <p14:creationId xmlns="" xmlns:p14="http://schemas.microsoft.com/office/powerpoint/2010/main" val="3053521774"/>
       </p:ext>
     </p:extLst>
   </p:cSld>
@@ -4200,7 +4205,7 @@
       </p:grpSpPr>
       <p:sp>
         <p:nvSpPr>
-          <p:cNvPr id="2" name="Title 1"/>
+          <p:cNvPr id="5" name="Title 4"/>
           <p:cNvSpPr>
             <a:spLocks noGrp="1"/>
           </p:cNvSpPr>
@@ -4215,7 +4220,7 @@
           <a:p>
             <a:r>
               <a:rPr lang="de-DE" dirty="0" smtClean="0"/>
-              <a:t>Erweiterbarkeit</a:t>
+              <a:t>Minimales Projekt</a:t>
             </a:r>
             <a:endParaRPr lang="de-DE" dirty="0"/>
           </a:p>
@@ -4223,7 +4228,7 @@
       </p:sp>
       <p:sp>
         <p:nvSpPr>
-          <p:cNvPr id="3" name="Content Placeholder 2"/>
+          <p:cNvPr id="6" name="Content Placeholder 5"/>
           <p:cNvSpPr>
             <a:spLocks noGrp="1"/>
           </p:cNvSpPr>
@@ -4236,13 +4241,19 @@
           <a:bodyPr/>
           <a:lstStyle/>
           <a:p>
+            <a:r>
+              <a:rPr lang="de-DE" sz="1600" dirty="0" smtClean="0"/>
+              <a:t>Reaktionsspiel</a:t>
+            </a:r>
+          </a:p>
+          <a:p>
             <a:pPr marL="457200" indent="-457200">
               <a:buFont typeface="Arial" panose="020B0604020202020204" pitchFamily="34" charset="0"/>
               <a:buChar char="•"/>
             </a:pPr>
             <a:r>
-              <a:rPr lang="de-DE" sz="2000" dirty="0" smtClean="0"/>
-              <a:t>Sobald die Infrastruktur geschaffen ist können weitere Spiele programmiert werden</a:t>
+              <a:rPr lang="de-DE" sz="1600" dirty="0" smtClean="0"/>
+              <a:t>Beide Bänder laufen eine zufällige Zeit</a:t>
             </a:r>
           </a:p>
           <a:p>
@@ -4251,8 +4262,16 @@
               <a:buChar char="•"/>
             </a:pPr>
             <a:r>
-              <a:rPr lang="de-DE" sz="2000" dirty="0" smtClean="0"/>
-              <a:t>Kompetitivere Spiele mit mehr Interaktion zwischen den Rechnern (strategischere Spielzüge (Angriff, Abwehr))</a:t>
+              <a:rPr lang="de-DE" sz="1600" dirty="0" smtClean="0"/>
+              <a:t>Gleiche oder verschiedene </a:t>
+            </a:r>
+            <a:r>
+              <a:rPr lang="de-DE" sz="1600" dirty="0"/>
+              <a:t>zufällige </a:t>
+            </a:r>
+            <a:r>
+              <a:rPr lang="de-DE" sz="1600" dirty="0" smtClean="0"/>
+              <a:t>Zeit?</a:t>
             </a:r>
           </a:p>
           <a:p>
@@ -4261,12 +4280,8 @@
               <a:buChar char="•"/>
             </a:pPr>
             <a:r>
-              <a:rPr lang="de-DE" sz="2000" dirty="0" smtClean="0"/>
-              <a:t>Bibliothek für die entsprechende Infrastruktur zur Verfügung </a:t>
-            </a:r>
-            <a:r>
-              <a:rPr lang="de-DE" sz="2000" dirty="0" smtClean="0"/>
-              <a:t>stellen</a:t>
+              <a:rPr lang="de-DE" sz="1600" dirty="0" smtClean="0"/>
+              <a:t>Spielregeln und Protokoll entwerfen</a:t>
             </a:r>
           </a:p>
           <a:p>
@@ -4275,10 +4290,9 @@
               <a:buChar char="•"/>
             </a:pPr>
             <a:r>
-              <a:rPr lang="de-DE" sz="2000" dirty="0" smtClean="0"/>
-              <a:t>Masterknoten organisiert Daten für die Statistik auf der Webseite</a:t>
-            </a:r>
-            <a:endParaRPr lang="de-DE" sz="2000" dirty="0" smtClean="0"/>
+              <a:rPr lang="de-DE" sz="1600" dirty="0" smtClean="0"/>
+              <a:t>Sobald das Band stoppt reagieren die Spieler schnellstmöglich mit Tastendruck</a:t>
+            </a:r>
           </a:p>
           <a:p>
             <a:pPr marL="457200" indent="-457200">
@@ -4286,8 +4300,8 @@
               <a:buChar char="•"/>
             </a:pPr>
             <a:r>
-              <a:rPr lang="de-DE" sz="2000" dirty="0" smtClean="0"/>
-              <a:t>Eine GUI(LCD-Schirm?) und LED-Streifen können die Spiele visuell unterstützen</a:t>
+              <a:rPr lang="de-DE" sz="1600" dirty="0" smtClean="0"/>
+              <a:t>Die Zeitdifferenz zwischen Bandstopp und Tastendruck wird gemessen</a:t>
             </a:r>
           </a:p>
           <a:p>
@@ -4296,17 +4310,69 @@
               <a:buChar char="•"/>
             </a:pPr>
             <a:r>
-              <a:rPr lang="de-DE" sz="2000" dirty="0" smtClean="0"/>
-              <a:t>Tonausgabe (Jingles)</a:t>
-            </a:r>
-            <a:endParaRPr lang="de-DE" sz="2000" dirty="0"/>
+              <a:rPr lang="de-DE" sz="1600" dirty="0" smtClean="0"/>
+              <a:t>Die Knoten handeln den Sieger aus und geben diesen auf einer Anzeige aus</a:t>
+            </a:r>
+          </a:p>
+          <a:p>
+            <a:r>
+              <a:rPr lang="de-DE" sz="1600" dirty="0" smtClean="0"/>
+              <a:t>Glücksrad</a:t>
+            </a:r>
+          </a:p>
+          <a:p>
+            <a:pPr marL="285750" indent="-285750">
+              <a:buFont typeface="Arial" panose="020B0604020202020204" pitchFamily="34" charset="0"/>
+              <a:buChar char="•"/>
+            </a:pPr>
+            <a:r>
+              <a:rPr lang="de-DE" sz="1600" dirty="0" smtClean="0"/>
+              <a:t>Im </a:t>
+            </a:r>
+            <a:r>
+              <a:rPr lang="de-DE" sz="1600" dirty="0" smtClean="0"/>
+              <a:t>Fall, </a:t>
+            </a:r>
+            <a:r>
+              <a:rPr lang="de-DE" sz="1600" dirty="0" smtClean="0"/>
+              <a:t>dass kein Band benutzt werden kann</a:t>
+            </a:r>
+          </a:p>
+          <a:p>
+            <a:pPr marL="285750" indent="-285750">
+              <a:buFont typeface="Arial" panose="020B0604020202020204" pitchFamily="34" charset="0"/>
+              <a:buChar char="•"/>
+            </a:pPr>
+            <a:r>
+              <a:rPr lang="de-DE" sz="1600" dirty="0" smtClean="0"/>
+              <a:t>Die Spieler versuchen mit der Kombination von Zahlenfolgen bzw. möglichst hohen Zahlen eine sehr hohe Gesamtpunktzahl zu erreichen</a:t>
+            </a:r>
+          </a:p>
+          <a:p>
+            <a:pPr marL="285750" indent="-285750">
+              <a:buFont typeface="Arial" panose="020B0604020202020204" pitchFamily="34" charset="0"/>
+              <a:buChar char="•"/>
+            </a:pPr>
+            <a:r>
+              <a:rPr lang="de-DE" sz="1600" dirty="0" err="1"/>
+              <a:t>Kompetitivität</a:t>
+            </a:r>
+            <a:r>
+              <a:rPr lang="de-DE" sz="1600" dirty="0"/>
+              <a:t> </a:t>
+            </a:r>
+            <a:r>
+              <a:rPr lang="de-DE" sz="1600" dirty="0" smtClean="0"/>
+              <a:t>fragwürdig?</a:t>
+            </a:r>
+            <a:endParaRPr lang="de-DE" sz="1600" dirty="0"/>
           </a:p>
         </p:txBody>
       </p:sp>
     </p:spTree>
     <p:extLst>
       <p:ext uri="{BB962C8B-B14F-4D97-AF65-F5344CB8AC3E}">
-        <p14:creationId xmlns:p14="http://schemas.microsoft.com/office/powerpoint/2010/main" xmlns="" val="2759879228"/>
+        <p14:creationId xmlns="" xmlns:p14="http://schemas.microsoft.com/office/powerpoint/2010/main" val="3587378439"/>
       </p:ext>
     </p:extLst>
   </p:cSld>
@@ -4358,7 +4424,7 @@
           <a:p>
             <a:r>
               <a:rPr lang="de-DE" dirty="0" smtClean="0"/>
-              <a:t>Benötigte Hardware</a:t>
+              <a:t>Erweiterbarkeit</a:t>
             </a:r>
             <a:endParaRPr lang="de-DE" dirty="0"/>
           </a:p>
@@ -4385,7 +4451,35 @@
             </a:pPr>
             <a:r>
               <a:rPr lang="de-DE" sz="2000" dirty="0" smtClean="0"/>
-              <a:t>Einen Rechner pro Serverschrank</a:t>
+              <a:t>Sobald die Infrastruktur geschaffen </a:t>
+            </a:r>
+            <a:r>
+              <a:rPr lang="de-DE" sz="2000" dirty="0" smtClean="0"/>
+              <a:t>ist, </a:t>
+            </a:r>
+            <a:r>
+              <a:rPr lang="de-DE" sz="2000" dirty="0" smtClean="0"/>
+              <a:t>können weitere Spiele programmiert werden</a:t>
+            </a:r>
+          </a:p>
+          <a:p>
+            <a:pPr marL="812800" lvl="1" indent="-457200">
+              <a:buFont typeface="Arial" panose="020B0604020202020204" pitchFamily="34" charset="0"/>
+              <a:buChar char="•"/>
+            </a:pPr>
+            <a:r>
+              <a:rPr lang="de-DE" sz="2000" dirty="0" smtClean="0"/>
+              <a:t>Kompetitivere Spiele mit mehr Interaktion zwischen den Rechnern (strategischere Spielzüge (Angriff, Abwehr))</a:t>
+            </a:r>
+          </a:p>
+          <a:p>
+            <a:pPr marL="812800" lvl="1" indent="-457200">
+              <a:buFont typeface="Arial" panose="020B0604020202020204" pitchFamily="34" charset="0"/>
+              <a:buChar char="•"/>
+            </a:pPr>
+            <a:r>
+              <a:rPr lang="de-DE" sz="2000" dirty="0" smtClean="0"/>
+              <a:t>Bibliothek für die entsprechende Infrastruktur zur Verfügung stellen</a:t>
             </a:r>
           </a:p>
           <a:p>
@@ -4395,7 +4489,7 @@
             </a:pPr>
             <a:r>
               <a:rPr lang="de-DE" sz="2000" dirty="0" smtClean="0"/>
-              <a:t>Passende Magnetbänder</a:t>
+              <a:t>Masterknoten organisiert Daten für die Statistik auf der Webseite</a:t>
             </a:r>
           </a:p>
           <a:p>
@@ -4405,17 +4499,7 @@
             </a:pPr>
             <a:r>
               <a:rPr lang="de-DE" sz="2000" dirty="0" smtClean="0"/>
-              <a:t>Anzeige (7-Segment oder LCD oder ?)</a:t>
-            </a:r>
-          </a:p>
-          <a:p>
-            <a:pPr marL="812800" lvl="1" indent="-457200">
-              <a:buFont typeface="Arial" panose="020B0604020202020204" pitchFamily="34" charset="0"/>
-              <a:buChar char="•"/>
-            </a:pPr>
-            <a:r>
-              <a:rPr lang="de-DE" sz="2000" dirty="0" smtClean="0"/>
-              <a:t>Steuerkreis ?</a:t>
+              <a:t>Eine GUI(LCD-Schirm?) und LED-Streifen können die Spiele visuell unterstützen</a:t>
             </a:r>
           </a:p>
           <a:p>
@@ -4424,55 +4508,9 @@
               <a:buChar char="•"/>
             </a:pPr>
             <a:r>
-              <a:rPr lang="de-DE" sz="2000" dirty="0" err="1" smtClean="0"/>
-              <a:t>Evt</a:t>
-            </a:r>
-            <a:r>
               <a:rPr lang="de-DE" sz="2000" dirty="0" smtClean="0"/>
-              <a:t>. alten Antrieb mit Schrittmotoren ersetzen</a:t>
-            </a:r>
-          </a:p>
-          <a:p>
-            <a:pPr marL="812800" lvl="1" indent="-457200">
-              <a:buFont typeface="Arial" panose="020B0604020202020204" pitchFamily="34" charset="0"/>
-              <a:buChar char="•"/>
-            </a:pPr>
-            <a:r>
-              <a:rPr lang="de-DE" sz="2000" dirty="0" smtClean="0"/>
-              <a:t>Steuerkreis ?</a:t>
-            </a:r>
-          </a:p>
-          <a:p>
-            <a:pPr marL="457200" indent="-457200">
-              <a:buFont typeface="Arial" panose="020B0604020202020204" pitchFamily="34" charset="0"/>
-              <a:buChar char="•"/>
-            </a:pPr>
-            <a:r>
-              <a:rPr lang="de-DE" sz="2000" dirty="0" smtClean="0"/>
-              <a:t>Kaputte Taster, Schalter ersetzen</a:t>
-            </a:r>
-          </a:p>
-          <a:p>
-            <a:pPr marL="457200" indent="-457200">
-              <a:buFont typeface="Arial" panose="020B0604020202020204" pitchFamily="34" charset="0"/>
-              <a:buChar char="•"/>
-            </a:pPr>
-            <a:r>
-              <a:rPr lang="de-DE" sz="2000" dirty="0" smtClean="0"/>
-              <a:t>Glühlampen mit LED ersetzen</a:t>
-            </a:r>
-          </a:p>
-          <a:p>
-            <a:pPr marL="457200" indent="-457200">
-              <a:buFont typeface="Arial" panose="020B0604020202020204" pitchFamily="34" charset="0"/>
-              <a:buChar char="•"/>
-            </a:pPr>
-            <a:r>
-              <a:rPr lang="de-DE" sz="2000" dirty="0" smtClean="0"/>
-              <a:t>Kaputte/verlorene Plastikteile ersetzen (3D-Drucken?)</a:t>
-            </a:r>
-          </a:p>
-          <a:p>
+              <a:t>Tonausgabe (Jingles)</a:t>
+            </a:r>
             <a:endParaRPr lang="de-DE" sz="2000" dirty="0"/>
           </a:p>
         </p:txBody>
@@ -4480,7 +4518,7 @@
     </p:spTree>
     <p:extLst>
       <p:ext uri="{BB962C8B-B14F-4D97-AF65-F5344CB8AC3E}">
-        <p14:creationId xmlns:p14="http://schemas.microsoft.com/office/powerpoint/2010/main" xmlns="" val="4048618436"/>
+        <p14:creationId xmlns="" xmlns:p14="http://schemas.microsoft.com/office/powerpoint/2010/main" val="2759879228"/>
       </p:ext>
     </p:extLst>
   </p:cSld>
@@ -4532,6 +4570,180 @@
           <a:p>
             <a:r>
               <a:rPr lang="de-DE" dirty="0" smtClean="0"/>
+              <a:t>Benötigte Hardware</a:t>
+            </a:r>
+            <a:endParaRPr lang="de-DE" dirty="0"/>
+          </a:p>
+        </p:txBody>
+      </p:sp>
+      <p:sp>
+        <p:nvSpPr>
+          <p:cNvPr id="3" name="Content Placeholder 2"/>
+          <p:cNvSpPr>
+            <a:spLocks noGrp="1"/>
+          </p:cNvSpPr>
+          <p:nvPr>
+            <p:ph idx="1"/>
+          </p:nvPr>
+        </p:nvSpPr>
+        <p:spPr/>
+        <p:txBody>
+          <a:bodyPr/>
+          <a:lstStyle/>
+          <a:p>
+            <a:pPr marL="457200" indent="-457200">
+              <a:buFont typeface="Arial" panose="020B0604020202020204" pitchFamily="34" charset="0"/>
+              <a:buChar char="•"/>
+            </a:pPr>
+            <a:r>
+              <a:rPr lang="de-DE" sz="2000" dirty="0" smtClean="0"/>
+              <a:t>Einen Rechner pro Serverschrank</a:t>
+            </a:r>
+          </a:p>
+          <a:p>
+            <a:pPr marL="457200" indent="-457200">
+              <a:buFont typeface="Arial" panose="020B0604020202020204" pitchFamily="34" charset="0"/>
+              <a:buChar char="•"/>
+            </a:pPr>
+            <a:r>
+              <a:rPr lang="de-DE" sz="2000" dirty="0" smtClean="0"/>
+              <a:t>Passende Magnetbänder</a:t>
+            </a:r>
+          </a:p>
+          <a:p>
+            <a:pPr marL="457200" indent="-457200">
+              <a:buFont typeface="Arial" panose="020B0604020202020204" pitchFamily="34" charset="0"/>
+              <a:buChar char="•"/>
+            </a:pPr>
+            <a:r>
+              <a:rPr lang="de-DE" sz="2000" dirty="0" smtClean="0"/>
+              <a:t>Anzeige (7-Segment oder LCD oder ?)</a:t>
+            </a:r>
+          </a:p>
+          <a:p>
+            <a:pPr marL="812800" lvl="1" indent="-457200">
+              <a:buFont typeface="Arial" panose="020B0604020202020204" pitchFamily="34" charset="0"/>
+              <a:buChar char="•"/>
+            </a:pPr>
+            <a:r>
+              <a:rPr lang="de-DE" sz="2000" dirty="0" smtClean="0"/>
+              <a:t>Steuerkreis ?</a:t>
+            </a:r>
+          </a:p>
+          <a:p>
+            <a:pPr marL="457200" indent="-457200">
+              <a:buFont typeface="Arial" panose="020B0604020202020204" pitchFamily="34" charset="0"/>
+              <a:buChar char="•"/>
+            </a:pPr>
+            <a:r>
+              <a:rPr lang="de-DE" sz="2000" dirty="0" err="1" smtClean="0"/>
+              <a:t>Evt</a:t>
+            </a:r>
+            <a:r>
+              <a:rPr lang="de-DE" sz="2000" dirty="0" smtClean="0"/>
+              <a:t>. alten Antrieb mit Schrittmotoren ersetzen</a:t>
+            </a:r>
+          </a:p>
+          <a:p>
+            <a:pPr marL="812800" lvl="1" indent="-457200">
+              <a:buFont typeface="Arial" panose="020B0604020202020204" pitchFamily="34" charset="0"/>
+              <a:buChar char="•"/>
+            </a:pPr>
+            <a:r>
+              <a:rPr lang="de-DE" sz="2000" dirty="0" smtClean="0"/>
+              <a:t>Steuerkreis ?</a:t>
+            </a:r>
+          </a:p>
+          <a:p>
+            <a:pPr marL="457200" indent="-457200">
+              <a:buFont typeface="Arial" panose="020B0604020202020204" pitchFamily="34" charset="0"/>
+              <a:buChar char="•"/>
+            </a:pPr>
+            <a:r>
+              <a:rPr lang="de-DE" sz="2000" dirty="0" smtClean="0"/>
+              <a:t>Kaputte Taster, Schalter ersetzen</a:t>
+            </a:r>
+          </a:p>
+          <a:p>
+            <a:pPr marL="457200" indent="-457200">
+              <a:buFont typeface="Arial" panose="020B0604020202020204" pitchFamily="34" charset="0"/>
+              <a:buChar char="•"/>
+            </a:pPr>
+            <a:r>
+              <a:rPr lang="de-DE" sz="2000" dirty="0" smtClean="0"/>
+              <a:t>Glühlampen mit LED ersetzen</a:t>
+            </a:r>
+          </a:p>
+          <a:p>
+            <a:pPr marL="457200" indent="-457200">
+              <a:buFont typeface="Arial" panose="020B0604020202020204" pitchFamily="34" charset="0"/>
+              <a:buChar char="•"/>
+            </a:pPr>
+            <a:r>
+              <a:rPr lang="de-DE" sz="2000" dirty="0" smtClean="0"/>
+              <a:t>Kaputte/verlorene Plastikteile ersetzen (3D-Drucken?)</a:t>
+            </a:r>
+          </a:p>
+          <a:p>
+            <a:endParaRPr lang="de-DE" sz="2000" dirty="0"/>
+          </a:p>
+        </p:txBody>
+      </p:sp>
+    </p:spTree>
+    <p:extLst>
+      <p:ext uri="{BB962C8B-B14F-4D97-AF65-F5344CB8AC3E}">
+        <p14:creationId xmlns="" xmlns:p14="http://schemas.microsoft.com/office/powerpoint/2010/main" val="4048618436"/>
+      </p:ext>
+    </p:extLst>
+  </p:cSld>
+  <p:clrMapOvr>
+    <a:masterClrMapping/>
+  </p:clrMapOvr>
+  <p:transition spd="slow"/>
+  <p:timing>
+    <p:tnLst>
+      <p:par>
+        <p:cTn id="1" dur="indefinite" restart="never" nodeType="tmRoot"/>
+      </p:par>
+    </p:tnLst>
+  </p:timing>
+</p:sld>
+</file>
+
+<file path=ppt/slides/slide8.xml><?xml version="1.0" encoding="utf-8"?>
+<p:sld xmlns:a="http://schemas.openxmlformats.org/drawingml/2006/main" xmlns:r="http://schemas.openxmlformats.org/officeDocument/2006/relationships" xmlns:p="http://schemas.openxmlformats.org/presentationml/2006/main">
+  <p:cSld>
+    <p:spTree>
+      <p:nvGrpSpPr>
+        <p:cNvPr id="1" name=""/>
+        <p:cNvGrpSpPr/>
+        <p:nvPr/>
+      </p:nvGrpSpPr>
+      <p:grpSpPr>
+        <a:xfrm>
+          <a:off x="0" y="0"/>
+          <a:ext cx="0" cy="0"/>
+          <a:chOff x="0" y="0"/>
+          <a:chExt cx="0" cy="0"/>
+        </a:xfrm>
+      </p:grpSpPr>
+      <p:sp>
+        <p:nvSpPr>
+          <p:cNvPr id="2" name="Title 1"/>
+          <p:cNvSpPr>
+            <a:spLocks noGrp="1"/>
+          </p:cNvSpPr>
+          <p:nvPr>
+            <p:ph type="title"/>
+          </p:nvPr>
+        </p:nvSpPr>
+        <p:spPr/>
+        <p:txBody>
+          <a:bodyPr/>
+          <a:lstStyle/>
+          <a:p>
+            <a:r>
+              <a:rPr lang="de-DE" dirty="0" smtClean="0"/>
               <a:t>Zeitplan</a:t>
             </a:r>
             <a:endParaRPr lang="de-DE" dirty="0"/>
@@ -4548,7 +4760,7 @@
             <p:ph idx="1"/>
             <p:extLst>
               <p:ext uri="{D42A27DB-BD31-4B8C-83A1-F6EECF244321}">
-                <p14:modId xmlns:p14="http://schemas.microsoft.com/office/powerpoint/2010/main" xmlns="" val="2062977345"/>
+                <p14:modId xmlns="" xmlns:p14="http://schemas.microsoft.com/office/powerpoint/2010/main" val="2062977345"/>
               </p:ext>
             </p:extLst>
           </p:nvPr>
@@ -4567,14 +4779,14 @@
                 <a:gridCol w="1115267">
                   <a:extLst>
                     <a:ext uri="{9D8B030D-6E8A-4147-A177-3AD203B41FA5}">
-                      <a16:colId xmlns:a16="http://schemas.microsoft.com/office/drawing/2014/main" xmlns="" val="2854159740"/>
+                      <a16:colId xmlns="" xmlns:a16="http://schemas.microsoft.com/office/drawing/2014/main" val="2854159740"/>
                     </a:ext>
                   </a:extLst>
                 </a:gridCol>
                 <a:gridCol w="7331725">
                   <a:extLst>
                     <a:ext uri="{9D8B030D-6E8A-4147-A177-3AD203B41FA5}">
-                      <a16:colId xmlns:a16="http://schemas.microsoft.com/office/drawing/2014/main" xmlns="" val="2191038580"/>
+                      <a16:colId xmlns="" xmlns:a16="http://schemas.microsoft.com/office/drawing/2014/main" val="2191038580"/>
                     </a:ext>
                   </a:extLst>
                 </a:gridCol>
@@ -4631,7 +4843,7 @@
                 </a:tc>
                 <a:extLst>
                   <a:ext uri="{0D108BD9-81ED-4DB2-BD59-A6C34878D82A}">
-                    <a16:rowId xmlns:a16="http://schemas.microsoft.com/office/drawing/2014/main" xmlns="" val="3061732656"/>
+                    <a16:rowId xmlns="" xmlns:a16="http://schemas.microsoft.com/office/drawing/2014/main" val="3061732656"/>
                   </a:ext>
                 </a:extLst>
               </a:tr>
@@ -4655,9 +4867,17 @@
                     <a:bodyPr/>
                     <a:lstStyle/>
                     <a:p>
+                      <a:pPr marL="285750" indent="-285750">
+                        <a:buFont typeface="Arial" panose="020B0604020202020204" pitchFamily="34" charset="0"/>
+                        <a:buChar char="•"/>
+                      </a:pPr>
                       <a:r>
                         <a:rPr lang="de-DE" dirty="0" smtClean="0"/>
-                        <a:t>Motoren und Taster</a:t>
+                        <a:t>Motoren </a:t>
+                      </a:r>
+                      <a:r>
+                        <a:rPr lang="de-DE" dirty="0" smtClean="0"/>
+                        <a:t>und Taster</a:t>
                       </a:r>
                       <a:r>
                         <a:rPr lang="de-DE" baseline="0" dirty="0" smtClean="0"/>
@@ -4670,7 +4890,7 @@
                 </a:tc>
                 <a:extLst>
                   <a:ext uri="{0D108BD9-81ED-4DB2-BD59-A6C34878D82A}">
-                    <a16:rowId xmlns:a16="http://schemas.microsoft.com/office/drawing/2014/main" xmlns="" val="2750500573"/>
+                    <a16:rowId xmlns="" xmlns:a16="http://schemas.microsoft.com/office/drawing/2014/main" val="2750500573"/>
                   </a:ext>
                 </a:extLst>
               </a:tr>
@@ -4694,6 +4914,10 @@
                     <a:bodyPr/>
                     <a:lstStyle/>
                     <a:p>
+                      <a:pPr marL="285750" indent="-285750">
+                        <a:buFont typeface="Arial" panose="020B0604020202020204" pitchFamily="34" charset="0"/>
+                        <a:buChar char="•"/>
+                      </a:pPr>
                       <a:r>
                         <a:rPr lang="de-DE" dirty="0" smtClean="0"/>
                         <a:t>Rudimentäre</a:t>
@@ -4717,7 +4941,7 @@
                 </a:tc>
                 <a:extLst>
                   <a:ext uri="{0D108BD9-81ED-4DB2-BD59-A6C34878D82A}">
-                    <a16:rowId xmlns:a16="http://schemas.microsoft.com/office/drawing/2014/main" xmlns="" val="2106524739"/>
+                    <a16:rowId xmlns="" xmlns:a16="http://schemas.microsoft.com/office/drawing/2014/main" val="2106524739"/>
                   </a:ext>
                 </a:extLst>
               </a:tr>
@@ -4794,7 +5018,7 @@
                 </a:tc>
                 <a:extLst>
                   <a:ext uri="{0D108BD9-81ED-4DB2-BD59-A6C34878D82A}">
-                    <a16:rowId xmlns:a16="http://schemas.microsoft.com/office/drawing/2014/main" xmlns="" val="2681223462"/>
+                    <a16:rowId xmlns="" xmlns:a16="http://schemas.microsoft.com/office/drawing/2014/main" val="2681223462"/>
                   </a:ext>
                 </a:extLst>
               </a:tr>
@@ -4805,7 +5029,7 @@
     </p:spTree>
     <p:extLst>
       <p:ext uri="{BB962C8B-B14F-4D97-AF65-F5344CB8AC3E}">
-        <p14:creationId xmlns:p14="http://schemas.microsoft.com/office/powerpoint/2010/main" xmlns="" val="4078573489"/>
+        <p14:creationId xmlns="" xmlns:p14="http://schemas.microsoft.com/office/powerpoint/2010/main" val="4078573489"/>
       </p:ext>
     </p:extLst>
   </p:cSld>
@@ -4823,7 +5047,7 @@
 </p:sld>
 </file>
 
-<file path=ppt/slides/slide8.xml><?xml version="1.0" encoding="utf-8"?>
+<file path=ppt/slides/slide9.xml><?xml version="1.0" encoding="utf-8"?>
 <p:sld xmlns:a="http://schemas.openxmlformats.org/drawingml/2006/main" xmlns:r="http://schemas.openxmlformats.org/officeDocument/2006/relationships" xmlns:p="http://schemas.openxmlformats.org/presentationml/2006/main">
   <p:cSld>
     <p:spTree>

</xml_diff>